<commit_message>
checked in new vision docs
</commit_message>
<xml_diff>
--- a/Docs/vision/focus group.pptx
+++ b/Docs/vision/focus group.pptx
@@ -7,9 +7,13 @@
   <p:sldIdLst>
     <p:sldId id="256" r:id="rId2"/>
     <p:sldId id="259" r:id="rId3"/>
-    <p:sldId id="260" r:id="rId4"/>
-    <p:sldId id="261" r:id="rId5"/>
-    <p:sldId id="263" r:id="rId6"/>
+    <p:sldId id="266" r:id="rId4"/>
+    <p:sldId id="260" r:id="rId5"/>
+    <p:sldId id="261" r:id="rId6"/>
+    <p:sldId id="264" r:id="rId7"/>
+    <p:sldId id="267" r:id="rId8"/>
+    <p:sldId id="268" r:id="rId9"/>
+    <p:sldId id="265" r:id="rId10"/>
   </p:sldIdLst>
   <p:sldSz cx="9144000" cy="6858000" type="screen4x3"/>
   <p:notesSz cx="6858000" cy="9144000"/>
@@ -305,7 +309,7 @@
           <a:p>
             <a:fld id="{C1D301B2-57C9-432A-BC65-211AB6982F6F}" type="datetimeFigureOut">
               <a:rPr lang="en-US" smtClean="0"/>
-              <a:t>12/12/2011</a:t>
+              <a:t>12/14/2011</a:t>
             </a:fld>
             <a:endParaRPr lang="en-US"/>
           </a:p>
@@ -470,7 +474,7 @@
           <a:p>
             <a:fld id="{C1D301B2-57C9-432A-BC65-211AB6982F6F}" type="datetimeFigureOut">
               <a:rPr lang="en-US" smtClean="0"/>
-              <a:t>12/12/2011</a:t>
+              <a:t>12/14/2011</a:t>
             </a:fld>
             <a:endParaRPr lang="en-US"/>
           </a:p>
@@ -645,7 +649,7 @@
           <a:p>
             <a:fld id="{C1D301B2-57C9-432A-BC65-211AB6982F6F}" type="datetimeFigureOut">
               <a:rPr lang="en-US" smtClean="0"/>
-              <a:t>12/12/2011</a:t>
+              <a:t>12/14/2011</a:t>
             </a:fld>
             <a:endParaRPr lang="en-US"/>
           </a:p>
@@ -810,7 +814,7 @@
           <a:p>
             <a:fld id="{C1D301B2-57C9-432A-BC65-211AB6982F6F}" type="datetimeFigureOut">
               <a:rPr lang="en-US" smtClean="0"/>
-              <a:t>12/12/2011</a:t>
+              <a:t>12/14/2011</a:t>
             </a:fld>
             <a:endParaRPr lang="en-US"/>
           </a:p>
@@ -1051,7 +1055,7 @@
           <a:p>
             <a:fld id="{C1D301B2-57C9-432A-BC65-211AB6982F6F}" type="datetimeFigureOut">
               <a:rPr lang="en-US" smtClean="0"/>
-              <a:t>12/12/2011</a:t>
+              <a:t>12/14/2011</a:t>
             </a:fld>
             <a:endParaRPr lang="en-US"/>
           </a:p>
@@ -1334,7 +1338,7 @@
           <a:p>
             <a:fld id="{C1D301B2-57C9-432A-BC65-211AB6982F6F}" type="datetimeFigureOut">
               <a:rPr lang="en-US" smtClean="0"/>
-              <a:t>12/12/2011</a:t>
+              <a:t>12/14/2011</a:t>
             </a:fld>
             <a:endParaRPr lang="en-US"/>
           </a:p>
@@ -1763,7 +1767,7 @@
           <a:p>
             <a:fld id="{C1D301B2-57C9-432A-BC65-211AB6982F6F}" type="datetimeFigureOut">
               <a:rPr lang="en-US" smtClean="0"/>
-              <a:t>12/12/2011</a:t>
+              <a:t>12/14/2011</a:t>
             </a:fld>
             <a:endParaRPr lang="en-US"/>
           </a:p>
@@ -1876,7 +1880,7 @@
           <a:p>
             <a:fld id="{C1D301B2-57C9-432A-BC65-211AB6982F6F}" type="datetimeFigureOut">
               <a:rPr lang="en-US" smtClean="0"/>
-              <a:t>12/12/2011</a:t>
+              <a:t>12/14/2011</a:t>
             </a:fld>
             <a:endParaRPr lang="en-US"/>
           </a:p>
@@ -1966,7 +1970,7 @@
           <a:p>
             <a:fld id="{C1D301B2-57C9-432A-BC65-211AB6982F6F}" type="datetimeFigureOut">
               <a:rPr lang="en-US" smtClean="0"/>
-              <a:t>12/12/2011</a:t>
+              <a:t>12/14/2011</a:t>
             </a:fld>
             <a:endParaRPr lang="en-US"/>
           </a:p>
@@ -2155,7 +2159,7 @@
           <a:p>
             <a:fld id="{C1D301B2-57C9-432A-BC65-211AB6982F6F}" type="datetimeFigureOut">
               <a:rPr lang="en-US" smtClean="0"/>
-              <a:t>12/12/2011</a:t>
+              <a:t>12/14/2011</a:t>
             </a:fld>
             <a:endParaRPr lang="en-US"/>
           </a:p>
@@ -2473,7 +2477,7 @@
           <a:p>
             <a:fld id="{C1D301B2-57C9-432A-BC65-211AB6982F6F}" type="datetimeFigureOut">
               <a:rPr lang="en-US" smtClean="0"/>
-              <a:t>12/12/2011</a:t>
+              <a:t>12/14/2011</a:t>
             </a:fld>
             <a:endParaRPr lang="en-US"/>
           </a:p>
@@ -2852,7 +2856,7 @@
           <a:p>
             <a:fld id="{C1D301B2-57C9-432A-BC65-211AB6982F6F}" type="datetimeFigureOut">
               <a:rPr lang="en-US" smtClean="0"/>
-              <a:t>12/12/2011</a:t>
+              <a:t>12/14/2011</a:t>
             </a:fld>
             <a:endParaRPr lang="en-US"/>
           </a:p>
@@ -3207,11 +3211,7 @@
             </a:br>
             <a:r>
               <a:rPr lang="en-US" dirty="0" smtClean="0"/>
-              <a:t>f</a:t>
-            </a:r>
-            <a:r>
-              <a:rPr lang="en-US" dirty="0" smtClean="0"/>
-              <a:t>ocus group goals</a:t>
+              <a:t>focus group goals</a:t>
             </a:r>
             <a:endParaRPr lang="en-US" dirty="0"/>
           </a:p>
@@ -3327,8 +3327,17 @@
           <a:p>
             <a:r>
               <a:rPr lang="en-US" dirty="0" smtClean="0"/>
-              <a:t>Prioritize the initial scenarios</a:t>
-            </a:r>
+              <a:t>Prioritize </a:t>
+            </a:r>
+            <a:r>
+              <a:rPr lang="en-US" dirty="0" smtClean="0"/>
+              <a:t>the initial </a:t>
+            </a:r>
+            <a:r>
+              <a:rPr lang="en-US" dirty="0" smtClean="0"/>
+              <a:t>scenarios (and identify new ones)</a:t>
+            </a:r>
+            <a:endParaRPr lang="en-US" dirty="0" smtClean="0"/>
           </a:p>
           <a:p>
             <a:r>
@@ -3351,8 +3360,17 @@
           <a:p>
             <a:r>
               <a:rPr lang="en-US" dirty="0" smtClean="0"/>
-              <a:t>Prioritize initial feature set</a:t>
-            </a:r>
+              <a:t>Identify and prioritize </a:t>
+            </a:r>
+            <a:r>
+              <a:rPr lang="en-US" dirty="0" smtClean="0"/>
+              <a:t>initial feature </a:t>
+            </a:r>
+            <a:r>
+              <a:rPr lang="en-US" dirty="0" smtClean="0"/>
+              <a:t>set </a:t>
+            </a:r>
+            <a:endParaRPr lang="en-US" dirty="0" smtClean="0"/>
           </a:p>
         </p:txBody>
       </p:sp>
@@ -3366,6 +3384,13 @@
   <p:clrMapOvr>
     <a:masterClrMapping/>
   </p:clrMapOvr>
+  <p:timing>
+    <p:tnLst>
+      <p:par>
+        <p:cTn id="1" dur="indefinite" restart="never" nodeType="tmRoot"/>
+      </p:par>
+    </p:tnLst>
+  </p:timing>
 </p:sld>
 </file>
 
@@ -3403,7 +3428,7 @@
           <a:p>
             <a:r>
               <a:rPr lang="en-US" dirty="0" smtClean="0"/>
-              <a:t>Concept Validation</a:t>
+              <a:t>Pre-screen information</a:t>
             </a:r>
             <a:endParaRPr lang="en-US" dirty="0"/>
           </a:p>
@@ -3421,7 +3446,9 @@
         </p:nvSpPr>
         <p:spPr/>
         <p:txBody>
-          <a:bodyPr/>
+          <a:bodyPr>
+            <a:normAutofit fontScale="92500"/>
+          </a:bodyPr>
           <a:lstStyle/>
           <a:p>
             <a:pPr marL="114300" indent="0">
@@ -3429,34 +3456,65 @@
             </a:pPr>
             <a:r>
               <a:rPr lang="en-US" dirty="0" smtClean="0"/>
-              <a:t>Run through the </a:t>
-            </a:r>
-            <a:r>
-              <a:rPr lang="en-US" dirty="0" err="1" smtClean="0"/>
-              <a:t>powerpoint</a:t>
-            </a:r>
-            <a:r>
-              <a:rPr lang="en-US" dirty="0" smtClean="0"/>
-              <a:t> form of the pitch</a:t>
-            </a:r>
-          </a:p>
-          <a:p>
-            <a:r>
-              <a:rPr lang="en-US" dirty="0" smtClean="0"/>
-              <a:t>Is this a product that you’d be interested in?</a:t>
-            </a:r>
-          </a:p>
-          <a:p>
-            <a:r>
-              <a:rPr lang="en-US" dirty="0" smtClean="0"/>
-              <a:t>What is most compelling about it?</a:t>
+              <a:t>User segment</a:t>
+            </a:r>
+          </a:p>
+          <a:p>
+            <a:r>
+              <a:rPr lang="en-US" dirty="0" smtClean="0"/>
+              <a:t>Age group (under 25, 25-39, 39+)</a:t>
+            </a:r>
+          </a:p>
+          <a:p>
+            <a:r>
+              <a:rPr lang="en-US" dirty="0" smtClean="0"/>
+              <a:t>Professional or home-maker (or both?)</a:t>
+            </a:r>
+          </a:p>
+          <a:p>
+            <a:r>
+              <a:rPr lang="en-US" dirty="0" smtClean="0"/>
+              <a:t>Kids (number, age)</a:t>
             </a:r>
           </a:p>
           <a:p>
             <a:pPr marL="114300" indent="0">
               <a:buNone/>
             </a:pPr>
-            <a:endParaRPr lang="en-US" dirty="0" smtClean="0"/>
+            <a:r>
+              <a:rPr lang="en-US" dirty="0" smtClean="0"/>
+              <a:t>Technology</a:t>
+            </a:r>
+          </a:p>
+          <a:p>
+            <a:r>
+              <a:rPr lang="en-US" dirty="0" smtClean="0"/>
+              <a:t>Email address</a:t>
+            </a:r>
+          </a:p>
+          <a:p>
+            <a:r>
+              <a:rPr lang="en-US" dirty="0" smtClean="0"/>
+              <a:t>Do you have a FB, twitter</a:t>
+            </a:r>
+          </a:p>
+          <a:p>
+            <a:r>
+              <a:rPr lang="en-US" dirty="0" smtClean="0"/>
+              <a:t>What do you use for e-mail</a:t>
+            </a:r>
+          </a:p>
+          <a:p>
+            <a:r>
+              <a:rPr lang="en-US" dirty="0" smtClean="0"/>
+              <a:t>What do you use for calendar</a:t>
+            </a:r>
+          </a:p>
+          <a:p>
+            <a:r>
+              <a:rPr lang="en-US" dirty="0" smtClean="0"/>
+              <a:t>Do you use a to-do / grocery list app?  If so which one?</a:t>
+            </a:r>
           </a:p>
           <a:p>
             <a:pPr marL="114300" indent="0">
@@ -3464,25 +3522,19 @@
             </a:pPr>
             <a:r>
               <a:rPr lang="en-US" dirty="0" smtClean="0"/>
-              <a:t>What did you think of the presentation?</a:t>
-            </a:r>
-          </a:p>
-          <a:p>
-            <a:r>
-              <a:rPr lang="en-US" dirty="0" smtClean="0"/>
-              <a:t>What were your top three takeaways?</a:t>
-            </a:r>
-          </a:p>
-          <a:p>
-            <a:r>
-              <a:rPr lang="en-US" dirty="0" smtClean="0"/>
-              <a:t>What was left unclear?</a:t>
-            </a:r>
-          </a:p>
-          <a:p>
-            <a:r>
-              <a:rPr lang="en-US" dirty="0" smtClean="0"/>
-              <a:t>How could we improve it?</a:t>
+              <a:t>Future</a:t>
+            </a:r>
+          </a:p>
+          <a:p>
+            <a:r>
+              <a:rPr lang="en-US" dirty="0" smtClean="0"/>
+              <a:t>Do you mind if we contact you later?</a:t>
+            </a:r>
+          </a:p>
+          <a:p>
+            <a:r>
+              <a:rPr lang="en-US" dirty="0" smtClean="0"/>
+              <a:t>Would you consider being a beta tester?</a:t>
             </a:r>
             <a:endParaRPr lang="en-US" dirty="0"/>
           </a:p>
@@ -3491,7 +3543,7 @@
     </p:spTree>
     <p:extLst>
       <p:ext uri="{BB962C8B-B14F-4D97-AF65-F5344CB8AC3E}">
-        <p14:creationId xmlns:p14="http://schemas.microsoft.com/office/powerpoint/2010/main" val="988247125"/>
+        <p14:creationId xmlns:p14="http://schemas.microsoft.com/office/powerpoint/2010/main" val="3278039376"/>
       </p:ext>
     </p:extLst>
   </p:cSld>
@@ -3535,7 +3587,7 @@
           <a:p>
             <a:r>
               <a:rPr lang="en-US" dirty="0" smtClean="0"/>
-              <a:t>Scenarios</a:t>
+              <a:t>Concept Validation</a:t>
             </a:r>
             <a:endParaRPr lang="en-US" dirty="0"/>
           </a:p>
@@ -3553,7 +3605,9 @@
         </p:nvSpPr>
         <p:spPr/>
         <p:txBody>
-          <a:bodyPr/>
+          <a:bodyPr>
+            <a:normAutofit fontScale="77500" lnSpcReduction="20000"/>
+          </a:bodyPr>
           <a:lstStyle/>
           <a:p>
             <a:pPr marL="114300" indent="0">
@@ -3561,43 +3615,27 @@
             </a:pPr>
             <a:r>
               <a:rPr lang="en-US" dirty="0" smtClean="0"/>
-              <a:t>We walked through six scenarios:</a:t>
-            </a:r>
-          </a:p>
-          <a:p>
-            <a:r>
-              <a:rPr lang="en-US" dirty="0" smtClean="0"/>
-              <a:t>Mom’s birthday</a:t>
-            </a:r>
-          </a:p>
-          <a:p>
-            <a:r>
-              <a:rPr lang="en-US" dirty="0" smtClean="0"/>
-              <a:t>Clean the gutters</a:t>
-            </a:r>
-          </a:p>
-          <a:p>
-            <a:r>
-              <a:rPr lang="en-US" dirty="0" smtClean="0"/>
-              <a:t>Order catering for a party</a:t>
-            </a:r>
-          </a:p>
-          <a:p>
-            <a:r>
-              <a:rPr lang="en-US" dirty="0" smtClean="0"/>
-              <a:t>Renew your passport</a:t>
-            </a:r>
-          </a:p>
-          <a:p>
-            <a:r>
-              <a:rPr lang="en-US" dirty="0" smtClean="0"/>
-              <a:t>Savings account for college</a:t>
-            </a:r>
-          </a:p>
-          <a:p>
-            <a:r>
-              <a:rPr lang="en-US" dirty="0" smtClean="0"/>
-              <a:t>Get your oil changed</a:t>
+              <a:t>Run through the </a:t>
+            </a:r>
+            <a:r>
+              <a:rPr lang="en-US" dirty="0" err="1" smtClean="0"/>
+              <a:t>powerpoint</a:t>
+            </a:r>
+            <a:r>
+              <a:rPr lang="en-US" dirty="0" smtClean="0"/>
+              <a:t> form of the pitch</a:t>
+            </a:r>
+          </a:p>
+          <a:p>
+            <a:r>
+              <a:rPr lang="en-US" dirty="0" smtClean="0"/>
+              <a:t>Is this a product that you’d be interested in?</a:t>
+            </a:r>
+          </a:p>
+          <a:p>
+            <a:r>
+              <a:rPr lang="en-US" dirty="0" smtClean="0"/>
+              <a:t>What is most compelling about it?</a:t>
             </a:r>
           </a:p>
           <a:p>
@@ -3607,15 +3645,87 @@
             <a:endParaRPr lang="en-US" dirty="0" smtClean="0"/>
           </a:p>
           <a:p>
-            <a:r>
-              <a:rPr lang="en-US" dirty="0" smtClean="0"/>
-              <a:t>What were the top three scenarios and why?</a:t>
-            </a:r>
-          </a:p>
-          <a:p>
-            <a:r>
-              <a:rPr lang="en-US" dirty="0" smtClean="0"/>
-              <a:t>What are other similar scenarios that would be even more appealing?</a:t>
+            <a:pPr marL="114300" indent="0">
+              <a:buNone/>
+            </a:pPr>
+            <a:r>
+              <a:rPr lang="en-US" dirty="0" smtClean="0"/>
+              <a:t>Questionnaire / discussion</a:t>
+            </a:r>
+          </a:p>
+          <a:p>
+            <a:pPr marL="114300" indent="0">
+              <a:buNone/>
+            </a:pPr>
+            <a:endParaRPr lang="en-US" dirty="0" smtClean="0"/>
+          </a:p>
+          <a:p>
+            <a:pPr marL="114300" indent="0">
+              <a:buNone/>
+            </a:pPr>
+            <a:r>
+              <a:rPr lang="en-US" dirty="0" smtClean="0"/>
+              <a:t>Name/Brand</a:t>
+            </a:r>
+            <a:endParaRPr lang="en-US" dirty="0" smtClean="0"/>
+          </a:p>
+          <a:p>
+            <a:r>
+              <a:rPr lang="en-US" dirty="0"/>
+              <a:t>What did you think of “</a:t>
+            </a:r>
+            <a:r>
+              <a:rPr lang="en-US" dirty="0" err="1"/>
+              <a:t>myvalet</a:t>
+            </a:r>
+            <a:r>
+              <a:rPr lang="en-US" dirty="0"/>
+              <a:t>” as a name?  What image does it invoke?</a:t>
+            </a:r>
+          </a:p>
+          <a:p>
+            <a:r>
+              <a:rPr lang="en-US" dirty="0"/>
+              <a:t>What did you think of the tagline “simplify your life”?  Does the product description match the expectations it evokes?</a:t>
+            </a:r>
+          </a:p>
+          <a:p>
+            <a:r>
+              <a:rPr lang="en-US" dirty="0"/>
+              <a:t>What other product name or tagline could be more appropriate?</a:t>
+            </a:r>
+          </a:p>
+          <a:p>
+            <a:pPr marL="114300" indent="0">
+              <a:buNone/>
+            </a:pPr>
+            <a:endParaRPr lang="en-US" dirty="0" smtClean="0"/>
+          </a:p>
+          <a:p>
+            <a:pPr marL="114300" indent="0">
+              <a:buNone/>
+            </a:pPr>
+            <a:r>
+              <a:rPr lang="en-US" dirty="0" smtClean="0"/>
+              <a:t>What did you think of the presentation?</a:t>
+            </a:r>
+          </a:p>
+          <a:p>
+            <a:r>
+              <a:rPr lang="en-US" dirty="0" smtClean="0"/>
+              <a:t>What were your top three takeaways?</a:t>
+            </a:r>
+          </a:p>
+          <a:p>
+            <a:r>
+              <a:rPr lang="en-US" dirty="0" smtClean="0"/>
+              <a:t>What was left unclear?</a:t>
+            </a:r>
+          </a:p>
+          <a:p>
+            <a:r>
+              <a:rPr lang="en-US" dirty="0" smtClean="0"/>
+              <a:t>How could we improve it?</a:t>
             </a:r>
             <a:endParaRPr lang="en-US" dirty="0"/>
           </a:p>
@@ -3624,13 +3734,20 @@
     </p:spTree>
     <p:extLst>
       <p:ext uri="{BB962C8B-B14F-4D97-AF65-F5344CB8AC3E}">
-        <p14:creationId xmlns:p14="http://schemas.microsoft.com/office/powerpoint/2010/main" val="56332763"/>
+        <p14:creationId xmlns:p14="http://schemas.microsoft.com/office/powerpoint/2010/main" val="988247125"/>
       </p:ext>
     </p:extLst>
   </p:cSld>
   <p:clrMapOvr>
     <a:masterClrMapping/>
   </p:clrMapOvr>
+  <p:timing>
+    <p:tnLst>
+      <p:par>
+        <p:cTn id="1" dur="indefinite" restart="never" nodeType="tmRoot"/>
+      </p:par>
+    </p:tnLst>
+  </p:timing>
 </p:sld>
 </file>
 
@@ -3668,7 +3785,7 @@
           <a:p>
             <a:r>
               <a:rPr lang="en-US" dirty="0" smtClean="0"/>
-              <a:t>Name / Brand</a:t>
+              <a:t>Scenarios</a:t>
             </a:r>
             <a:endParaRPr lang="en-US" dirty="0"/>
           </a:p>
@@ -3686,32 +3803,90 @@
         </p:nvSpPr>
         <p:spPr/>
         <p:txBody>
-          <a:bodyPr/>
-          <a:lstStyle/>
-          <a:p>
-            <a:r>
-              <a:rPr lang="en-US" dirty="0" smtClean="0"/>
-              <a:t>What did you think of “</a:t>
-            </a:r>
-            <a:r>
-              <a:rPr lang="en-US" dirty="0" err="1" smtClean="0"/>
-              <a:t>myvalet</a:t>
-            </a:r>
-            <a:r>
-              <a:rPr lang="en-US" dirty="0" smtClean="0"/>
-              <a:t>” as a name?  What image does it invoke?</a:t>
-            </a:r>
-          </a:p>
-          <a:p>
-            <a:r>
-              <a:rPr lang="en-US" dirty="0" smtClean="0"/>
-              <a:t>What did you think of the tagline “simplify your life”?  Does the product description match the expectations it evokes?</a:t>
-            </a:r>
-          </a:p>
-          <a:p>
-            <a:r>
-              <a:rPr lang="en-US" dirty="0" smtClean="0"/>
-              <a:t>What other product name or tagline could be more appropriate?</a:t>
+          <a:bodyPr>
+            <a:normAutofit lnSpcReduction="10000"/>
+          </a:bodyPr>
+          <a:lstStyle/>
+          <a:p>
+            <a:pPr marL="114300" indent="0">
+              <a:buNone/>
+            </a:pPr>
+            <a:r>
+              <a:rPr lang="en-US" dirty="0" smtClean="0"/>
+              <a:t>Questionnaire / discussion </a:t>
+            </a:r>
+          </a:p>
+          <a:p>
+            <a:pPr marL="114300" indent="0">
+              <a:buNone/>
+            </a:pPr>
+            <a:endParaRPr lang="en-US" dirty="0" smtClean="0"/>
+          </a:p>
+          <a:p>
+            <a:pPr marL="114300" indent="0">
+              <a:buNone/>
+            </a:pPr>
+            <a:r>
+              <a:rPr lang="en-US" dirty="0" smtClean="0"/>
+              <a:t>We </a:t>
+            </a:r>
+            <a:r>
+              <a:rPr lang="en-US" dirty="0" smtClean="0"/>
+              <a:t>walked through six scenarios:</a:t>
+            </a:r>
+          </a:p>
+          <a:p>
+            <a:r>
+              <a:rPr lang="en-US" dirty="0" smtClean="0"/>
+              <a:t>Mom’s birthday</a:t>
+            </a:r>
+          </a:p>
+          <a:p>
+            <a:r>
+              <a:rPr lang="en-US" dirty="0" smtClean="0"/>
+              <a:t>Clean the gutters</a:t>
+            </a:r>
+          </a:p>
+          <a:p>
+            <a:r>
+              <a:rPr lang="en-US" dirty="0" smtClean="0"/>
+              <a:t>Order catering for a party</a:t>
+            </a:r>
+          </a:p>
+          <a:p>
+            <a:r>
+              <a:rPr lang="en-US" dirty="0" smtClean="0"/>
+              <a:t>Renew your passport</a:t>
+            </a:r>
+          </a:p>
+          <a:p>
+            <a:r>
+              <a:rPr lang="en-US" dirty="0" smtClean="0"/>
+              <a:t>Savings account for college</a:t>
+            </a:r>
+          </a:p>
+          <a:p>
+            <a:r>
+              <a:rPr lang="en-US" dirty="0" smtClean="0"/>
+              <a:t>Get your oil changed</a:t>
+            </a:r>
+          </a:p>
+          <a:p>
+            <a:pPr marL="114300" indent="0">
+              <a:buNone/>
+            </a:pPr>
+            <a:endParaRPr lang="en-US" dirty="0" smtClean="0"/>
+          </a:p>
+          <a:p>
+            <a:r>
+              <a:rPr lang="en-US" dirty="0" smtClean="0"/>
+              <a:t>What were the top three scenarios and why?</a:t>
+            </a:r>
+          </a:p>
+          <a:p>
+            <a:r>
+              <a:rPr lang="en-US" dirty="0" smtClean="0"/>
+              <a:t>What are other similar scenarios that would be even more appealing?</a:t>
             </a:r>
             <a:endParaRPr lang="en-US" dirty="0"/>
           </a:p>
@@ -3720,7 +3895,509 @@
     </p:spTree>
     <p:extLst>
       <p:ext uri="{BB962C8B-B14F-4D97-AF65-F5344CB8AC3E}">
-        <p14:creationId xmlns:p14="http://schemas.microsoft.com/office/powerpoint/2010/main" val="4067068099"/>
+        <p14:creationId xmlns:p14="http://schemas.microsoft.com/office/powerpoint/2010/main" val="56332763"/>
+      </p:ext>
+    </p:extLst>
+  </p:cSld>
+  <p:clrMapOvr>
+    <a:masterClrMapping/>
+  </p:clrMapOvr>
+  <p:timing>
+    <p:tnLst>
+      <p:par>
+        <p:cTn id="1" dur="indefinite" restart="never" nodeType="tmRoot"/>
+      </p:par>
+    </p:tnLst>
+  </p:timing>
+</p:sld>
+</file>
+
+<file path=ppt/slides/slide6.xml><?xml version="1.0" encoding="utf-8"?>
+<p:sld xmlns:a="http://schemas.openxmlformats.org/drawingml/2006/main" xmlns:r="http://schemas.openxmlformats.org/officeDocument/2006/relationships" xmlns:p="http://schemas.openxmlformats.org/presentationml/2006/main">
+  <p:cSld>
+    <p:spTree>
+      <p:nvGrpSpPr>
+        <p:cNvPr id="1" name=""/>
+        <p:cNvGrpSpPr/>
+        <p:nvPr/>
+      </p:nvGrpSpPr>
+      <p:grpSpPr>
+        <a:xfrm>
+          <a:off x="0" y="0"/>
+          <a:ext cx="0" cy="0"/>
+          <a:chOff x="0" y="0"/>
+          <a:chExt cx="0" cy="0"/>
+        </a:xfrm>
+      </p:grpSpPr>
+      <p:sp>
+        <p:nvSpPr>
+          <p:cNvPr id="2" name="Title 1"/>
+          <p:cNvSpPr>
+            <a:spLocks noGrp="1"/>
+          </p:cNvSpPr>
+          <p:nvPr>
+            <p:ph type="title"/>
+          </p:nvPr>
+        </p:nvSpPr>
+        <p:spPr/>
+        <p:txBody>
+          <a:bodyPr/>
+          <a:lstStyle/>
+          <a:p>
+            <a:r>
+              <a:rPr lang="en-US" dirty="0" smtClean="0"/>
+              <a:t>General Features</a:t>
+            </a:r>
+            <a:endParaRPr lang="en-US" dirty="0"/>
+          </a:p>
+        </p:txBody>
+      </p:sp>
+      <p:sp>
+        <p:nvSpPr>
+          <p:cNvPr id="3" name="Content Placeholder 2"/>
+          <p:cNvSpPr>
+            <a:spLocks noGrp="1"/>
+          </p:cNvSpPr>
+          <p:nvPr>
+            <p:ph idx="1"/>
+          </p:nvPr>
+        </p:nvSpPr>
+        <p:spPr/>
+        <p:txBody>
+          <a:bodyPr>
+            <a:normAutofit fontScale="77500" lnSpcReduction="20000"/>
+          </a:bodyPr>
+          <a:lstStyle/>
+          <a:p>
+            <a:pPr marL="114300" indent="0">
+              <a:buNone/>
+            </a:pPr>
+            <a:r>
+              <a:rPr lang="en-US" dirty="0" smtClean="0"/>
+              <a:t>Questionnaire</a:t>
+            </a:r>
+          </a:p>
+          <a:p>
+            <a:pPr marL="114300" indent="0">
+              <a:buNone/>
+            </a:pPr>
+            <a:endParaRPr lang="en-US" dirty="0" smtClean="0"/>
+          </a:p>
+          <a:p>
+            <a:r>
+              <a:rPr lang="en-US" dirty="0" smtClean="0"/>
+              <a:t>How do you want to interact with the service?</a:t>
+            </a:r>
+          </a:p>
+          <a:p>
+            <a:pPr lvl="1"/>
+            <a:r>
+              <a:rPr lang="en-US" dirty="0" smtClean="0"/>
+              <a:t>Separate app on the phone?</a:t>
+            </a:r>
+          </a:p>
+          <a:p>
+            <a:pPr lvl="1"/>
+            <a:r>
+              <a:rPr lang="en-US" dirty="0" smtClean="0"/>
+              <a:t>Web site (browser app)</a:t>
+            </a:r>
+          </a:p>
+          <a:p>
+            <a:pPr lvl="1"/>
+            <a:r>
+              <a:rPr lang="en-US" dirty="0" smtClean="0"/>
+              <a:t>E-mail plug-in (which one)</a:t>
+            </a:r>
+          </a:p>
+          <a:p>
+            <a:pPr lvl="1"/>
+            <a:r>
+              <a:rPr lang="en-US" dirty="0" smtClean="0"/>
+              <a:t>Calendar plug-in (which one)</a:t>
+            </a:r>
+          </a:p>
+          <a:p>
+            <a:pPr lvl="1"/>
+            <a:r>
+              <a:rPr lang="en-US" dirty="0" smtClean="0"/>
+              <a:t>Facebook app</a:t>
+            </a:r>
+          </a:p>
+          <a:p>
+            <a:r>
+              <a:rPr lang="en-US" dirty="0" smtClean="0"/>
+              <a:t>Rate the way you want to tell the service what you’d like to get done</a:t>
+            </a:r>
+          </a:p>
+          <a:p>
+            <a:pPr lvl="1"/>
+            <a:r>
+              <a:rPr lang="en-US" dirty="0" smtClean="0"/>
+              <a:t>speak into a phone</a:t>
+            </a:r>
+          </a:p>
+          <a:p>
+            <a:pPr lvl="1"/>
+            <a:r>
+              <a:rPr lang="en-US" dirty="0" smtClean="0"/>
+              <a:t>type into a phone</a:t>
+            </a:r>
+          </a:p>
+          <a:p>
+            <a:pPr lvl="1"/>
+            <a:r>
+              <a:rPr lang="en-US" dirty="0"/>
+              <a:t>t</a:t>
+            </a:r>
+            <a:r>
+              <a:rPr lang="en-US" dirty="0" smtClean="0"/>
+              <a:t>ype into a browser</a:t>
+            </a:r>
+          </a:p>
+          <a:p>
+            <a:pPr lvl="1"/>
+            <a:r>
+              <a:rPr lang="en-US" dirty="0" smtClean="0"/>
+              <a:t>Infer from your existing data (FB, Calendar, E-mail)</a:t>
+            </a:r>
+          </a:p>
+          <a:p>
+            <a:pPr lvl="1"/>
+            <a:r>
+              <a:rPr lang="en-US" dirty="0"/>
+              <a:t>o</a:t>
+            </a:r>
+            <a:r>
+              <a:rPr lang="en-US" dirty="0" smtClean="0"/>
+              <a:t>ther?</a:t>
+            </a:r>
+            <a:endParaRPr lang="en-US" dirty="0"/>
+          </a:p>
+          <a:p>
+            <a:r>
+              <a:rPr lang="en-US" dirty="0"/>
+              <a:t>Would it be OK to have a menu of choices, or is it important to have “freeform” input (and potentially get asked clarifying questions</a:t>
+            </a:r>
+            <a:r>
+              <a:rPr lang="en-US" dirty="0" smtClean="0"/>
+              <a:t>?)</a:t>
+            </a:r>
+          </a:p>
+          <a:p>
+            <a:r>
+              <a:rPr lang="en-US" dirty="0" smtClean="0"/>
+              <a:t>Are shared to-do lists important for the concept to work?</a:t>
+            </a:r>
+          </a:p>
+          <a:p>
+            <a:r>
+              <a:rPr lang="en-US" dirty="0" smtClean="0"/>
+              <a:t>Do you want the app to post information to FB / twitter?</a:t>
+            </a:r>
+            <a:endParaRPr lang="en-US" dirty="0"/>
+          </a:p>
+        </p:txBody>
+      </p:sp>
+    </p:spTree>
+    <p:extLst>
+      <p:ext uri="{BB962C8B-B14F-4D97-AF65-F5344CB8AC3E}">
+        <p14:creationId xmlns:p14="http://schemas.microsoft.com/office/powerpoint/2010/main" val="3733670899"/>
+      </p:ext>
+    </p:extLst>
+  </p:cSld>
+  <p:clrMapOvr>
+    <a:masterClrMapping/>
+  </p:clrMapOvr>
+</p:sld>
+</file>
+
+<file path=ppt/slides/slide7.xml><?xml version="1.0" encoding="utf-8"?>
+<p:sld xmlns:a="http://schemas.openxmlformats.org/drawingml/2006/main" xmlns:r="http://schemas.openxmlformats.org/officeDocument/2006/relationships" xmlns:p="http://schemas.openxmlformats.org/presentationml/2006/main">
+  <p:cSld>
+    <p:spTree>
+      <p:nvGrpSpPr>
+        <p:cNvPr id="1" name=""/>
+        <p:cNvGrpSpPr/>
+        <p:nvPr/>
+      </p:nvGrpSpPr>
+      <p:grpSpPr>
+        <a:xfrm>
+          <a:off x="0" y="0"/>
+          <a:ext cx="0" cy="0"/>
+          <a:chOff x="0" y="0"/>
+          <a:chExt cx="0" cy="0"/>
+        </a:xfrm>
+      </p:grpSpPr>
+      <p:sp>
+        <p:nvSpPr>
+          <p:cNvPr id="2" name="Title 1"/>
+          <p:cNvSpPr>
+            <a:spLocks noGrp="1"/>
+          </p:cNvSpPr>
+          <p:nvPr>
+            <p:ph type="title"/>
+          </p:nvPr>
+        </p:nvSpPr>
+        <p:spPr/>
+        <p:txBody>
+          <a:bodyPr/>
+          <a:lstStyle/>
+          <a:p>
+            <a:r>
+              <a:rPr lang="en-US" dirty="0" smtClean="0"/>
+              <a:t>Follow-up questions</a:t>
+            </a:r>
+            <a:endParaRPr lang="en-US" dirty="0"/>
+          </a:p>
+        </p:txBody>
+      </p:sp>
+      <p:sp>
+        <p:nvSpPr>
+          <p:cNvPr id="3" name="Content Placeholder 2"/>
+          <p:cNvSpPr>
+            <a:spLocks noGrp="1"/>
+          </p:cNvSpPr>
+          <p:nvPr>
+            <p:ph idx="1"/>
+          </p:nvPr>
+        </p:nvSpPr>
+        <p:spPr/>
+        <p:txBody>
+          <a:bodyPr/>
+          <a:lstStyle/>
+          <a:p>
+            <a:r>
+              <a:rPr lang="en-US" dirty="0" smtClean="0"/>
+              <a:t>Would you like to be a beta-tester?</a:t>
+            </a:r>
+          </a:p>
+          <a:p>
+            <a:r>
+              <a:rPr lang="en-US" dirty="0" smtClean="0"/>
+              <a:t>Help prioritize features for the scenarios we selected</a:t>
+            </a:r>
+          </a:p>
+          <a:p>
+            <a:r>
+              <a:rPr lang="en-US" dirty="0" smtClean="0"/>
+              <a:t>Run by new scenarios and solicit new ones from them</a:t>
+            </a:r>
+          </a:p>
+          <a:p>
+            <a:r>
+              <a:rPr lang="en-US" dirty="0" smtClean="0"/>
+              <a:t>Install and run the app and give us feedback</a:t>
+            </a:r>
+            <a:endParaRPr lang="en-US" dirty="0"/>
+          </a:p>
+        </p:txBody>
+      </p:sp>
+    </p:spTree>
+    <p:extLst>
+      <p:ext uri="{BB962C8B-B14F-4D97-AF65-F5344CB8AC3E}">
+        <p14:creationId xmlns:p14="http://schemas.microsoft.com/office/powerpoint/2010/main" val="2859580146"/>
+      </p:ext>
+    </p:extLst>
+  </p:cSld>
+  <p:clrMapOvr>
+    <a:masterClrMapping/>
+  </p:clrMapOvr>
+</p:sld>
+</file>
+
+<file path=ppt/slides/slide8.xml><?xml version="1.0" encoding="utf-8"?>
+<p:sld xmlns:a="http://schemas.openxmlformats.org/drawingml/2006/main" xmlns:r="http://schemas.openxmlformats.org/officeDocument/2006/relationships" xmlns:p="http://schemas.openxmlformats.org/presentationml/2006/main">
+  <p:cSld>
+    <p:spTree>
+      <p:nvGrpSpPr>
+        <p:cNvPr id="1" name=""/>
+        <p:cNvGrpSpPr/>
+        <p:nvPr/>
+      </p:nvGrpSpPr>
+      <p:grpSpPr>
+        <a:xfrm>
+          <a:off x="0" y="0"/>
+          <a:ext cx="0" cy="0"/>
+          <a:chOff x="0" y="0"/>
+          <a:chExt cx="0" cy="0"/>
+        </a:xfrm>
+      </p:grpSpPr>
+      <p:sp>
+        <p:nvSpPr>
+          <p:cNvPr id="2" name="Title 1"/>
+          <p:cNvSpPr>
+            <a:spLocks noGrp="1"/>
+          </p:cNvSpPr>
+          <p:nvPr>
+            <p:ph type="title"/>
+          </p:nvPr>
+        </p:nvSpPr>
+        <p:spPr/>
+        <p:txBody>
+          <a:bodyPr/>
+          <a:lstStyle/>
+          <a:p>
+            <a:r>
+              <a:rPr lang="en-US" dirty="0" smtClean="0"/>
+              <a:t>backup</a:t>
+            </a:r>
+            <a:endParaRPr lang="en-US" dirty="0"/>
+          </a:p>
+        </p:txBody>
+      </p:sp>
+      <p:sp>
+        <p:nvSpPr>
+          <p:cNvPr id="3" name="Content Placeholder 2"/>
+          <p:cNvSpPr>
+            <a:spLocks noGrp="1"/>
+          </p:cNvSpPr>
+          <p:nvPr>
+            <p:ph idx="1"/>
+          </p:nvPr>
+        </p:nvSpPr>
+        <p:spPr/>
+        <p:txBody>
+          <a:bodyPr/>
+          <a:lstStyle/>
+          <a:p>
+            <a:endParaRPr lang="en-US"/>
+          </a:p>
+        </p:txBody>
+      </p:sp>
+    </p:spTree>
+    <p:extLst>
+      <p:ext uri="{BB962C8B-B14F-4D97-AF65-F5344CB8AC3E}">
+        <p14:creationId xmlns:p14="http://schemas.microsoft.com/office/powerpoint/2010/main" val="2767542164"/>
+      </p:ext>
+    </p:extLst>
+  </p:cSld>
+  <p:clrMapOvr>
+    <a:masterClrMapping/>
+  </p:clrMapOvr>
+</p:sld>
+</file>
+
+<file path=ppt/slides/slide9.xml><?xml version="1.0" encoding="utf-8"?>
+<p:sld xmlns:a="http://schemas.openxmlformats.org/drawingml/2006/main" xmlns:r="http://schemas.openxmlformats.org/officeDocument/2006/relationships" xmlns:p="http://schemas.openxmlformats.org/presentationml/2006/main">
+  <p:cSld>
+    <p:spTree>
+      <p:nvGrpSpPr>
+        <p:cNvPr id="1" name=""/>
+        <p:cNvGrpSpPr/>
+        <p:nvPr/>
+      </p:nvGrpSpPr>
+      <p:grpSpPr>
+        <a:xfrm>
+          <a:off x="0" y="0"/>
+          <a:ext cx="0" cy="0"/>
+          <a:chOff x="0" y="0"/>
+          <a:chExt cx="0" cy="0"/>
+        </a:xfrm>
+      </p:grpSpPr>
+      <p:sp>
+        <p:nvSpPr>
+          <p:cNvPr id="2" name="Title 1"/>
+          <p:cNvSpPr>
+            <a:spLocks noGrp="1"/>
+          </p:cNvSpPr>
+          <p:nvPr>
+            <p:ph type="title"/>
+          </p:nvPr>
+        </p:nvSpPr>
+        <p:spPr/>
+        <p:txBody>
+          <a:bodyPr/>
+          <a:lstStyle/>
+          <a:p>
+            <a:r>
+              <a:rPr lang="en-US" dirty="0" smtClean="0"/>
+              <a:t>Features</a:t>
+            </a:r>
+            <a:endParaRPr lang="en-US" dirty="0"/>
+          </a:p>
+        </p:txBody>
+      </p:sp>
+      <p:sp>
+        <p:nvSpPr>
+          <p:cNvPr id="3" name="Content Placeholder 2"/>
+          <p:cNvSpPr>
+            <a:spLocks noGrp="1"/>
+          </p:cNvSpPr>
+          <p:nvPr>
+            <p:ph idx="1"/>
+          </p:nvPr>
+        </p:nvSpPr>
+        <p:spPr/>
+        <p:txBody>
+          <a:bodyPr>
+            <a:normAutofit/>
+          </a:bodyPr>
+          <a:lstStyle/>
+          <a:p>
+            <a:r>
+              <a:rPr lang="en-US" dirty="0" smtClean="0"/>
+              <a:t>Rate the general actions that are most important</a:t>
+            </a:r>
+          </a:p>
+          <a:p>
+            <a:pPr lvl="1"/>
+            <a:r>
+              <a:rPr lang="en-US" dirty="0" smtClean="0"/>
+              <a:t>Call</a:t>
+            </a:r>
+          </a:p>
+          <a:p>
+            <a:pPr lvl="1"/>
+            <a:r>
+              <a:rPr lang="en-US" dirty="0" smtClean="0"/>
+              <a:t>Text</a:t>
+            </a:r>
+          </a:p>
+          <a:p>
+            <a:pPr lvl="1"/>
+            <a:r>
+              <a:rPr lang="en-US" dirty="0" smtClean="0"/>
+              <a:t>Map</a:t>
+            </a:r>
+          </a:p>
+          <a:p>
+            <a:pPr lvl="1"/>
+            <a:r>
+              <a:rPr lang="en-US" dirty="0" smtClean="0"/>
+              <a:t>Email</a:t>
+            </a:r>
+          </a:p>
+          <a:p>
+            <a:pPr lvl="1"/>
+            <a:r>
+              <a:rPr lang="en-US" dirty="0" smtClean="0"/>
+              <a:t>Facebook post</a:t>
+            </a:r>
+          </a:p>
+          <a:p>
+            <a:pPr lvl="1"/>
+            <a:r>
+              <a:rPr lang="en-US" dirty="0" smtClean="0"/>
+              <a:t>Add reminder to calendar</a:t>
+            </a:r>
+          </a:p>
+          <a:p>
+            <a:pPr lvl="1"/>
+            <a:r>
+              <a:rPr lang="en-US" dirty="0" smtClean="0"/>
+              <a:t>Tweet</a:t>
+            </a:r>
+          </a:p>
+          <a:p>
+            <a:endParaRPr lang="en-US" dirty="0" smtClean="0"/>
+          </a:p>
+        </p:txBody>
+      </p:sp>
+    </p:spTree>
+    <p:extLst>
+      <p:ext uri="{BB962C8B-B14F-4D97-AF65-F5344CB8AC3E}">
+        <p14:creationId xmlns:p14="http://schemas.microsoft.com/office/powerpoint/2010/main" val="2422623519"/>
       </p:ext>
     </p:extLst>
   </p:cSld>

</xml_diff>